<commit_message>
primer borrador de los apartado introducción sistemas de dialogo y a la problematica y requisitos del diálogo
</commit_message>
<xml_diff>
--- a/Presentación1.pptx
+++ b/Presentación1.pptx
@@ -6,6 +6,7 @@
   </p:sldMasterIdLst>
   <p:sldIdLst>
     <p:sldId id="256" r:id="rId2"/>
+    <p:sldId id="257" r:id="rId3"/>
   </p:sldIdLst>
   <p:sldSz cx="12192000" cy="6858000"/>
   <p:notesSz cx="6858000" cy="9144000"/>
@@ -243,7 +244,7 @@
           <a:p>
             <a:fld id="{DE7CA698-4D04-4307-B112-7F3118797394}" type="datetimeFigureOut">
               <a:rPr lang="es-ES" smtClean="0"/>
-              <a:t>06/12/2017</a:t>
+              <a:t>07/12/2017</a:t>
             </a:fld>
             <a:endParaRPr lang="es-ES"/>
           </a:p>
@@ -413,7 +414,7 @@
           <a:p>
             <a:fld id="{DE7CA698-4D04-4307-B112-7F3118797394}" type="datetimeFigureOut">
               <a:rPr lang="es-ES" smtClean="0"/>
-              <a:t>06/12/2017</a:t>
+              <a:t>07/12/2017</a:t>
             </a:fld>
             <a:endParaRPr lang="es-ES"/>
           </a:p>
@@ -593,7 +594,7 @@
           <a:p>
             <a:fld id="{DE7CA698-4D04-4307-B112-7F3118797394}" type="datetimeFigureOut">
               <a:rPr lang="es-ES" smtClean="0"/>
-              <a:t>06/12/2017</a:t>
+              <a:t>07/12/2017</a:t>
             </a:fld>
             <a:endParaRPr lang="es-ES"/>
           </a:p>
@@ -763,7 +764,7 @@
           <a:p>
             <a:fld id="{DE7CA698-4D04-4307-B112-7F3118797394}" type="datetimeFigureOut">
               <a:rPr lang="es-ES" smtClean="0"/>
-              <a:t>06/12/2017</a:t>
+              <a:t>07/12/2017</a:t>
             </a:fld>
             <a:endParaRPr lang="es-ES"/>
           </a:p>
@@ -1009,7 +1010,7 @@
           <a:p>
             <a:fld id="{DE7CA698-4D04-4307-B112-7F3118797394}" type="datetimeFigureOut">
               <a:rPr lang="es-ES" smtClean="0"/>
-              <a:t>06/12/2017</a:t>
+              <a:t>07/12/2017</a:t>
             </a:fld>
             <a:endParaRPr lang="es-ES"/>
           </a:p>
@@ -1241,7 +1242,7 @@
           <a:p>
             <a:fld id="{DE7CA698-4D04-4307-B112-7F3118797394}" type="datetimeFigureOut">
               <a:rPr lang="es-ES" smtClean="0"/>
-              <a:t>06/12/2017</a:t>
+              <a:t>07/12/2017</a:t>
             </a:fld>
             <a:endParaRPr lang="es-ES"/>
           </a:p>
@@ -1608,7 +1609,7 @@
           <a:p>
             <a:fld id="{DE7CA698-4D04-4307-B112-7F3118797394}" type="datetimeFigureOut">
               <a:rPr lang="es-ES" smtClean="0"/>
-              <a:t>06/12/2017</a:t>
+              <a:t>07/12/2017</a:t>
             </a:fld>
             <a:endParaRPr lang="es-ES"/>
           </a:p>
@@ -1726,7 +1727,7 @@
           <a:p>
             <a:fld id="{DE7CA698-4D04-4307-B112-7F3118797394}" type="datetimeFigureOut">
               <a:rPr lang="es-ES" smtClean="0"/>
-              <a:t>06/12/2017</a:t>
+              <a:t>07/12/2017</a:t>
             </a:fld>
             <a:endParaRPr lang="es-ES"/>
           </a:p>
@@ -1821,7 +1822,7 @@
           <a:p>
             <a:fld id="{DE7CA698-4D04-4307-B112-7F3118797394}" type="datetimeFigureOut">
               <a:rPr lang="es-ES" smtClean="0"/>
-              <a:t>06/12/2017</a:t>
+              <a:t>07/12/2017</a:t>
             </a:fld>
             <a:endParaRPr lang="es-ES"/>
           </a:p>
@@ -2098,7 +2099,7 @@
           <a:p>
             <a:fld id="{DE7CA698-4D04-4307-B112-7F3118797394}" type="datetimeFigureOut">
               <a:rPr lang="es-ES" smtClean="0"/>
-              <a:t>06/12/2017</a:t>
+              <a:t>07/12/2017</a:t>
             </a:fld>
             <a:endParaRPr lang="es-ES"/>
           </a:p>
@@ -2351,7 +2352,7 @@
           <a:p>
             <a:fld id="{DE7CA698-4D04-4307-B112-7F3118797394}" type="datetimeFigureOut">
               <a:rPr lang="es-ES" smtClean="0"/>
-              <a:t>06/12/2017</a:t>
+              <a:t>07/12/2017</a:t>
             </a:fld>
             <a:endParaRPr lang="es-ES"/>
           </a:p>
@@ -2564,7 +2565,7 @@
           <a:p>
             <a:fld id="{DE7CA698-4D04-4307-B112-7F3118797394}" type="datetimeFigureOut">
               <a:rPr lang="es-ES" smtClean="0"/>
-              <a:t>06/12/2017</a:t>
+              <a:t>07/12/2017</a:t>
             </a:fld>
             <a:endParaRPr lang="es-ES"/>
           </a:p>
@@ -3001,15 +3002,7 @@
             </a:r>
             <a:r>
               <a:rPr lang="es-ES" dirty="0" smtClean="0"/>
-              <a:t>: </a:t>
-            </a:r>
-            <a:r>
-              <a:rPr lang="es-ES" dirty="0" smtClean="0"/>
-              <a:t>El bueno, el feo y el malo</a:t>
-            </a:r>
-            <a:r>
-              <a:rPr lang="es-ES" dirty="0" smtClean="0"/>
-              <a:t>…</a:t>
+              <a:t>: El bueno, el feo y el malo…</a:t>
             </a:r>
           </a:p>
           <a:p>
@@ -3271,6 +3264,238 @@
     <p:extLst>
       <p:ext uri="{BB962C8B-B14F-4D97-AF65-F5344CB8AC3E}">
         <p14:creationId xmlns:p14="http://schemas.microsoft.com/office/powerpoint/2010/main" val="2486623878"/>
+      </p:ext>
+    </p:extLst>
+  </p:cSld>
+  <p:clrMapOvr>
+    <a:masterClrMapping/>
+  </p:clrMapOvr>
+</p:sld>
+</file>
+
+<file path=ppt/slides/slide2.xml><?xml version="1.0" encoding="utf-8"?>
+<p:sld xmlns:a="http://schemas.openxmlformats.org/drawingml/2006/main" xmlns:r="http://schemas.openxmlformats.org/officeDocument/2006/relationships" xmlns:p="http://schemas.openxmlformats.org/presentationml/2006/main">
+  <p:cSld>
+    <p:spTree>
+      <p:nvGrpSpPr>
+        <p:cNvPr id="1" name=""/>
+        <p:cNvGrpSpPr/>
+        <p:nvPr/>
+      </p:nvGrpSpPr>
+      <p:grpSpPr>
+        <a:xfrm>
+          <a:off x="0" y="0"/>
+          <a:ext cx="0" cy="0"/>
+          <a:chOff x="0" y="0"/>
+          <a:chExt cx="0" cy="0"/>
+        </a:xfrm>
+      </p:grpSpPr>
+      <p:sp>
+        <p:nvSpPr>
+          <p:cNvPr id="2" name="Rectángulo 1"/>
+          <p:cNvSpPr/>
+          <p:nvPr/>
+        </p:nvSpPr>
+        <p:spPr>
+          <a:xfrm>
+            <a:off x="436605" y="329672"/>
+            <a:ext cx="10668000" cy="2000548"/>
+          </a:xfrm>
+          <a:prstGeom prst="rect">
+            <a:avLst/>
+          </a:prstGeom>
+        </p:spPr>
+        <p:txBody>
+          <a:bodyPr wrap="square">
+            <a:spAutoFit/>
+          </a:bodyPr>
+          <a:lstStyle/>
+          <a:p>
+            <a:r>
+              <a:rPr lang="es-ES" sz="1600" b="1" dirty="0" smtClean="0"/>
+              <a:t>INTERFACES</a:t>
+            </a:r>
+          </a:p>
+          <a:p>
+            <a:r>
+              <a:rPr lang="es-ES" sz="1200" dirty="0"/>
+              <a:t/>
+            </a:r>
+            <a:br>
+              <a:rPr lang="es-ES" sz="1200" dirty="0"/>
+            </a:br>
+            <a:r>
+              <a:rPr lang="es-ES" sz="1200" b="1" dirty="0" smtClean="0"/>
+              <a:t>- T</a:t>
+            </a:r>
+            <a:r>
+              <a:rPr lang="es-ES" sz="1200" b="1" dirty="0" smtClean="0">
+                <a:solidFill>
+                  <a:srgbClr val="212121"/>
+                </a:solidFill>
+                <a:latin typeface="arial" panose="020B0604020202020204" pitchFamily="34" charset="0"/>
+              </a:rPr>
+              <a:t>ransaccional: </a:t>
+            </a:r>
+            <a:r>
+              <a:rPr lang="es-ES" sz="1200" dirty="0">
+                <a:solidFill>
+                  <a:srgbClr val="212121"/>
+                </a:solidFill>
+                <a:latin typeface="arial" panose="020B0604020202020204" pitchFamily="34" charset="0"/>
+              </a:rPr>
+              <a:t>si tiene la capacidad de realizar tareas o servicios para alguien. Está orientado a objetivos y sus usuarios lo usan para realizar cualquier solicitud. Dos oraciones de ejemplo para ordenar una pizza, ambas con un alto grado transaccional: </a:t>
+            </a:r>
+            <a:r>
+              <a:rPr lang="es-ES" sz="1200" dirty="0" smtClean="0">
+                <a:solidFill>
+                  <a:srgbClr val="212121"/>
+                </a:solidFill>
+                <a:latin typeface="arial" panose="020B0604020202020204" pitchFamily="34" charset="0"/>
+              </a:rPr>
+              <a:t>"pide pizza favorita" </a:t>
+            </a:r>
+            <a:r>
+              <a:rPr lang="es-ES" sz="1200" dirty="0">
+                <a:solidFill>
+                  <a:srgbClr val="212121"/>
+                </a:solidFill>
+                <a:latin typeface="arial" panose="020B0604020202020204" pitchFamily="34" charset="0"/>
+              </a:rPr>
+              <a:t>(estilo de línea de comando) y "Alexa </a:t>
+            </a:r>
+            <a:r>
+              <a:rPr lang="es-ES" sz="1200" dirty="0" smtClean="0">
+                <a:solidFill>
+                  <a:srgbClr val="212121"/>
+                </a:solidFill>
+                <a:latin typeface="arial" panose="020B0604020202020204" pitchFamily="34" charset="0"/>
+              </a:rPr>
+              <a:t>pide en </a:t>
+            </a:r>
+            <a:r>
+              <a:rPr lang="es-ES" sz="1200" dirty="0" err="1">
+                <a:solidFill>
+                  <a:srgbClr val="212121"/>
+                </a:solidFill>
+                <a:latin typeface="arial" panose="020B0604020202020204" pitchFamily="34" charset="0"/>
+              </a:rPr>
+              <a:t>Domino's</a:t>
+            </a:r>
+            <a:r>
+              <a:rPr lang="es-ES" sz="1200" dirty="0">
+                <a:solidFill>
+                  <a:srgbClr val="212121"/>
+                </a:solidFill>
+                <a:latin typeface="arial" panose="020B0604020202020204" pitchFamily="34" charset="0"/>
+              </a:rPr>
+              <a:t> </a:t>
+            </a:r>
+            <a:r>
+              <a:rPr lang="es-ES" sz="1200" dirty="0" smtClean="0">
+                <a:solidFill>
+                  <a:srgbClr val="212121"/>
+                </a:solidFill>
+                <a:latin typeface="arial" panose="020B0604020202020204" pitchFamily="34" charset="0"/>
+              </a:rPr>
+              <a:t>mi </a:t>
+            </a:r>
+            <a:r>
+              <a:rPr lang="es-ES" sz="1200" dirty="0">
+                <a:solidFill>
+                  <a:srgbClr val="212121"/>
+                </a:solidFill>
+                <a:latin typeface="arial" panose="020B0604020202020204" pitchFamily="34" charset="0"/>
+              </a:rPr>
+              <a:t>pizza favorita". </a:t>
+            </a:r>
+            <a:endParaRPr lang="es-ES" sz="1200" dirty="0" smtClean="0">
+              <a:solidFill>
+                <a:srgbClr val="212121"/>
+              </a:solidFill>
+              <a:latin typeface="arial" panose="020B0604020202020204" pitchFamily="34" charset="0"/>
+            </a:endParaRPr>
+          </a:p>
+          <a:p>
+            <a:endParaRPr lang="es-ES" sz="1200" dirty="0">
+              <a:solidFill>
+                <a:srgbClr val="212121"/>
+              </a:solidFill>
+              <a:latin typeface="arial" panose="020B0604020202020204" pitchFamily="34" charset="0"/>
+            </a:endParaRPr>
+          </a:p>
+          <a:p>
+            <a:r>
+              <a:rPr lang="es-ES" sz="1200" b="1" dirty="0" smtClean="0">
+                <a:solidFill>
+                  <a:srgbClr val="212121"/>
+                </a:solidFill>
+                <a:latin typeface="arial" panose="020B0604020202020204" pitchFamily="34" charset="0"/>
+              </a:rPr>
+              <a:t>- Conversacional:</a:t>
+            </a:r>
+            <a:r>
+              <a:rPr lang="es-ES" sz="1200" dirty="0" smtClean="0">
+                <a:solidFill>
+                  <a:srgbClr val="212121"/>
+                </a:solidFill>
+                <a:latin typeface="arial" panose="020B0604020202020204" pitchFamily="34" charset="0"/>
+              </a:rPr>
+              <a:t> </a:t>
+            </a:r>
+            <a:r>
+              <a:rPr lang="es-ES" sz="1200" dirty="0">
+                <a:solidFill>
+                  <a:srgbClr val="212121"/>
+                </a:solidFill>
+                <a:latin typeface="arial" panose="020B0604020202020204" pitchFamily="34" charset="0"/>
+              </a:rPr>
+              <a:t>cuando su intención es crear un diálogo natural con los usuarios, con un intercambio informal de información y pensamientos a través de palabras con ellos. Debe proporcionar la funcionalidad para crear conversaciones con usuarios tales como: </a:t>
+            </a:r>
+            <a:r>
+              <a:rPr lang="es-ES" sz="1200" dirty="0" err="1">
+                <a:solidFill>
+                  <a:srgbClr val="212121"/>
+                </a:solidFill>
+                <a:latin typeface="arial" panose="020B0604020202020204" pitchFamily="34" charset="0"/>
+              </a:rPr>
+              <a:t>smalltalk</a:t>
+            </a:r>
+            <a:r>
+              <a:rPr lang="es-ES" sz="1200" dirty="0">
+                <a:solidFill>
+                  <a:srgbClr val="212121"/>
+                </a:solidFill>
+                <a:latin typeface="arial" panose="020B0604020202020204" pitchFamily="34" charset="0"/>
+              </a:rPr>
+              <a:t> (hola, gracias, adiós, detalles personales y pasatiempos ...), gestión del contexto (¿la respuesta es "sí" relacionada con la oración anterior?) O memoria </a:t>
+            </a:r>
+            <a:r>
+              <a:rPr lang="es-ES" sz="1200" dirty="0" smtClean="0">
+                <a:solidFill>
+                  <a:srgbClr val="212121"/>
+                </a:solidFill>
+                <a:latin typeface="arial" panose="020B0604020202020204" pitchFamily="34" charset="0"/>
+              </a:rPr>
+              <a:t>(el </a:t>
+            </a:r>
+            <a:r>
+              <a:rPr lang="es-ES" sz="1200" dirty="0">
+                <a:solidFill>
+                  <a:srgbClr val="212121"/>
+                </a:solidFill>
+                <a:latin typeface="arial" panose="020B0604020202020204" pitchFamily="34" charset="0"/>
+              </a:rPr>
+              <a:t>usuario está dando información sobre dónde vive y dónde quiere ir, no preguntes dónde vive).</a:t>
+            </a:r>
+            <a:endParaRPr lang="es-ES" sz="1200" dirty="0"/>
+          </a:p>
+        </p:txBody>
+      </p:sp>
+    </p:spTree>
+    <p:extLst>
+      <p:ext uri="{BB962C8B-B14F-4D97-AF65-F5344CB8AC3E}">
+        <p14:creationId xmlns:p14="http://schemas.microsoft.com/office/powerpoint/2010/main" val="1667868146"/>
       </p:ext>
     </p:extLst>
   </p:cSld>

</xml_diff>